<commit_message>
Tuuu sửa psd+thêm file ui&Ux
</commit_message>
<xml_diff>
--- a/Documents/TTNhom.pptx
+++ b/Documents/TTNhom.pptx
@@ -9126,7 +9126,7 @@
         </p:nvSpPr>
         <p:spPr>
           <a:xfrm>
-            <a:off x="3815079" y="969264"/>
+            <a:off x="3464917" y="938003"/>
             <a:ext cx="5262166" cy="769441"/>
           </a:xfrm>
           <a:prstGeom prst="rect">
@@ -9141,13 +9141,13 @@
           <a:p>
             <a:pPr algn="ctr"/>
             <a:r>
-              <a:rPr lang="en-US" sz="4400" b="1" smtClean="0">
+              <a:rPr lang="en-US" sz="4400" b="1" dirty="0" smtClean="0">
                 <a:latin typeface="Segoe UI" panose="020B0502040204020203" pitchFamily="34" charset="0"/>
                 <a:cs typeface="Segoe UI" panose="020B0502040204020203" pitchFamily="34" charset="0"/>
               </a:rPr>
               <a:t>THANK YOU</a:t>
             </a:r>
-            <a:endParaRPr lang="en-US" sz="4400"/>
+            <a:endParaRPr lang="en-US" sz="4400" dirty="0"/>
           </a:p>
         </p:txBody>
       </p:sp>
@@ -9159,7 +9159,7 @@
         </p:nvSpPr>
         <p:spPr>
           <a:xfrm>
-            <a:off x="5745122" y="2645447"/>
+            <a:off x="5394960" y="2695539"/>
             <a:ext cx="1402080" cy="1402080"/>
           </a:xfrm>
           <a:prstGeom prst="ellipse">
@@ -9206,6 +9206,13 @@
   <p:clrMapOvr>
     <a:masterClrMapping/>
   </p:clrMapOvr>
+  <p:timing>
+    <p:tnLst>
+      <p:par>
+        <p:cTn id="1" dur="indefinite" restart="never" nodeType="tmRoot"/>
+      </p:par>
+    </p:tnLst>
+  </p:timing>
 </p:sld>
 </file>
 

</xml_diff>